<commit_message>
position of work updated
</commit_message>
<xml_diff>
--- a/position_of_work.pptx
+++ b/position_of_work.pptx
@@ -3384,21 +3384,21 @@
                 <a:latin typeface="Times New Roman" panose="02020603050405020304" pitchFamily="18" charset="0"/>
                 <a:cs typeface="Times New Roman" panose="02020603050405020304" pitchFamily="18" charset="0"/>
               </a:rPr>
-              <a:t>Subset of SSCOR problems reduced to eigenvalue problems (</a:t>
-            </a:r>
-            <a:r>
-              <a:rPr lang="en-GB" sz="788" dirty="0" err="1">
+              <a:t>Subset of SSCOR problems reduced to eigenvalue </a:t>
+            </a:r>
+            <a:r>
+              <a:rPr lang="en-GB" sz="788">
                 <a:latin typeface="Times New Roman" panose="02020603050405020304" pitchFamily="18" charset="0"/>
                 <a:cs typeface="Times New Roman" panose="02020603050405020304" pitchFamily="18" charset="0"/>
               </a:rPr>
-              <a:t>Rupnik</a:t>
-            </a:r>
-            <a:r>
-              <a:rPr lang="en-GB" sz="788" dirty="0">
+              <a:t>problems </a:t>
+            </a:r>
+            <a:r>
+              <a:rPr lang="en-GB" sz="788" smtClean="0">
                 <a:latin typeface="Times New Roman" panose="02020603050405020304" pitchFamily="18" charset="0"/>
                 <a:cs typeface="Times New Roman" panose="02020603050405020304" pitchFamily="18" charset="0"/>
               </a:rPr>
-              <a:t> et. al.)</a:t>
+              <a:t>[9]</a:t>
             </a:r>
             <a:endParaRPr lang="en-US" sz="788" dirty="0">
               <a:latin typeface="Times New Roman" panose="02020603050405020304" pitchFamily="18" charset="0"/>
@@ -3448,21 +3448,14 @@
                 <a:latin typeface="Times New Roman" panose="02020603050405020304" pitchFamily="18" charset="0"/>
                 <a:cs typeface="Times New Roman" panose="02020603050405020304" pitchFamily="18" charset="0"/>
               </a:rPr>
-              <a:t>Application of SUMCOR and SSCOR to Cross-Lingual Document Analysis (</a:t>
-            </a:r>
-            <a:r>
-              <a:rPr lang="en-GB" sz="788" dirty="0" err="1">
+              <a:t>Application of SUMCOR and SSCOR to Cross-Lingual Document Analysis </a:t>
+            </a:r>
+            <a:r>
+              <a:rPr lang="en-GB" sz="788" dirty="0" smtClean="0">
                 <a:latin typeface="Times New Roman" panose="02020603050405020304" pitchFamily="18" charset="0"/>
                 <a:cs typeface="Times New Roman" panose="02020603050405020304" pitchFamily="18" charset="0"/>
               </a:rPr>
-              <a:t>Rupnik</a:t>
-            </a:r>
-            <a:r>
-              <a:rPr lang="en-GB" sz="788" dirty="0">
-                <a:latin typeface="Times New Roman" panose="02020603050405020304" pitchFamily="18" charset="0"/>
-                <a:cs typeface="Times New Roman" panose="02020603050405020304" pitchFamily="18" charset="0"/>
-              </a:rPr>
-              <a:t> et. al.)</a:t>
+              <a:t>[8][9]</a:t>
             </a:r>
             <a:endParaRPr lang="en-US" sz="788" dirty="0">
               <a:latin typeface="Times New Roman" panose="02020603050405020304" pitchFamily="18" charset="0"/>
@@ -3512,21 +3505,14 @@
                 <a:latin typeface="Times New Roman" panose="02020603050405020304" pitchFamily="18" charset="0"/>
                 <a:cs typeface="Times New Roman" panose="02020603050405020304" pitchFamily="18" charset="0"/>
               </a:rPr>
-              <a:t>Application to Cross-Lingual Cluster Linking (</a:t>
-            </a:r>
-            <a:r>
-              <a:rPr lang="en-GB" sz="788" dirty="0" err="1">
+              <a:t>Application to Cross-Lingual Cluster </a:t>
+            </a:r>
+            <a:r>
+              <a:rPr lang="en-GB" sz="788" dirty="0" smtClean="0">
                 <a:latin typeface="Times New Roman" panose="02020603050405020304" pitchFamily="18" charset="0"/>
                 <a:cs typeface="Times New Roman" panose="02020603050405020304" pitchFamily="18" charset="0"/>
               </a:rPr>
-              <a:t>Rupnik</a:t>
-            </a:r>
-            <a:r>
-              <a:rPr lang="en-GB" sz="788" dirty="0">
-                <a:latin typeface="Times New Roman" panose="02020603050405020304" pitchFamily="18" charset="0"/>
-                <a:cs typeface="Times New Roman" panose="02020603050405020304" pitchFamily="18" charset="0"/>
-              </a:rPr>
-              <a:t> et. al.)</a:t>
+              <a:t>Linking [9][10]</a:t>
             </a:r>
             <a:endParaRPr lang="en-US" sz="788" dirty="0">
               <a:latin typeface="Times New Roman" panose="02020603050405020304" pitchFamily="18" charset="0"/>
@@ -3661,21 +3647,14 @@
                 <a:latin typeface="Times New Roman" panose="02020603050405020304" pitchFamily="18" charset="0"/>
                 <a:cs typeface="Times New Roman" panose="02020603050405020304" pitchFamily="18" charset="0"/>
               </a:rPr>
-              <a:t>  Horst Algorithm (</a:t>
-            </a:r>
-            <a:r>
-              <a:rPr lang="en-GB" sz="788" dirty="0" err="1">
+              <a:t>  Horst Algorithm </a:t>
+            </a:r>
+            <a:r>
+              <a:rPr lang="en-GB" sz="788" dirty="0" smtClean="0">
                 <a:latin typeface="Times New Roman" panose="02020603050405020304" pitchFamily="18" charset="0"/>
                 <a:cs typeface="Times New Roman" panose="02020603050405020304" pitchFamily="18" charset="0"/>
               </a:rPr>
-              <a:t>Rupnik</a:t>
-            </a:r>
-            <a:r>
-              <a:rPr lang="en-GB" sz="788" dirty="0">
-                <a:latin typeface="Times New Roman" panose="02020603050405020304" pitchFamily="18" charset="0"/>
-                <a:cs typeface="Times New Roman" panose="02020603050405020304" pitchFamily="18" charset="0"/>
-              </a:rPr>
-              <a:t> et. al.) </a:t>
+              <a:t>[8]</a:t>
             </a:r>
             <a:endParaRPr lang="en-US" sz="788" dirty="0">
               <a:latin typeface="Times New Roman" panose="02020603050405020304" pitchFamily="18" charset="0"/>
@@ -3693,7 +3672,7 @@
         <p:spPr>
           <a:xfrm>
             <a:off x="3996227" y="1667705"/>
-            <a:ext cx="921878" cy="456087"/>
+            <a:ext cx="921878" cy="334835"/>
           </a:xfrm>
           <a:prstGeom prst="rect">
             <a:avLst/>
@@ -3725,21 +3704,14 @@
                 <a:latin typeface="Times New Roman" panose="02020603050405020304" pitchFamily="18" charset="0"/>
                 <a:cs typeface="Times New Roman" panose="02020603050405020304" pitchFamily="18" charset="0"/>
               </a:rPr>
-              <a:t>SUMCOR NP-Hard (</a:t>
-            </a:r>
-            <a:r>
-              <a:rPr lang="en-GB" sz="788" dirty="0" err="1">
+              <a:t>SUMCOR </a:t>
+            </a:r>
+            <a:r>
+              <a:rPr lang="en-GB" sz="788" dirty="0" smtClean="0">
                 <a:latin typeface="Times New Roman" panose="02020603050405020304" pitchFamily="18" charset="0"/>
                 <a:cs typeface="Times New Roman" panose="02020603050405020304" pitchFamily="18" charset="0"/>
               </a:rPr>
-              <a:t>Rupnik</a:t>
-            </a:r>
-            <a:r>
-              <a:rPr lang="en-GB" sz="788" dirty="0">
-                <a:latin typeface="Times New Roman" panose="02020603050405020304" pitchFamily="18" charset="0"/>
-                <a:cs typeface="Times New Roman" panose="02020603050405020304" pitchFamily="18" charset="0"/>
-              </a:rPr>
-              <a:t> et. al.) </a:t>
+              <a:t>NP-Hard [8]</a:t>
             </a:r>
             <a:endParaRPr lang="en-US" sz="788" dirty="0">
               <a:latin typeface="Times New Roman" panose="02020603050405020304" pitchFamily="18" charset="0"/>
@@ -3789,21 +3761,14 @@
                 <a:latin typeface="Times New Roman" panose="02020603050405020304" pitchFamily="18" charset="0"/>
                 <a:cs typeface="Times New Roman" panose="02020603050405020304" pitchFamily="18" charset="0"/>
               </a:rPr>
-              <a:t>SUMCOR SDP relaxation (</a:t>
-            </a:r>
-            <a:r>
-              <a:rPr lang="en-GB" sz="788" dirty="0" err="1">
+              <a:t>SUMCOR SDP relaxation </a:t>
+            </a:r>
+            <a:r>
+              <a:rPr lang="en-GB" sz="788" dirty="0" smtClean="0">
                 <a:latin typeface="Times New Roman" panose="02020603050405020304" pitchFamily="18" charset="0"/>
                 <a:cs typeface="Times New Roman" panose="02020603050405020304" pitchFamily="18" charset="0"/>
               </a:rPr>
-              <a:t>Rupnik</a:t>
-            </a:r>
-            <a:r>
-              <a:rPr lang="en-GB" sz="788" dirty="0">
-                <a:latin typeface="Times New Roman" panose="02020603050405020304" pitchFamily="18" charset="0"/>
-                <a:cs typeface="Times New Roman" panose="02020603050405020304" pitchFamily="18" charset="0"/>
-              </a:rPr>
-              <a:t> et. al.) </a:t>
+              <a:t>[8]</a:t>
             </a:r>
             <a:endParaRPr lang="en-US" sz="788" dirty="0">
               <a:latin typeface="Times New Roman" panose="02020603050405020304" pitchFamily="18" charset="0"/>
@@ -3853,21 +3818,14 @@
                 <a:latin typeface="Times New Roman" panose="02020603050405020304" pitchFamily="18" charset="0"/>
                 <a:cs typeface="Times New Roman" panose="02020603050405020304" pitchFamily="18" charset="0"/>
               </a:rPr>
-              <a:t>Tractable global optimality bounds (</a:t>
-            </a:r>
-            <a:r>
-              <a:rPr lang="en-GB" sz="788" dirty="0" err="1">
+              <a:t>Tractable global optimality bounds </a:t>
+            </a:r>
+            <a:r>
+              <a:rPr lang="en-GB" sz="788" dirty="0" smtClean="0">
                 <a:latin typeface="Times New Roman" panose="02020603050405020304" pitchFamily="18" charset="0"/>
                 <a:cs typeface="Times New Roman" panose="02020603050405020304" pitchFamily="18" charset="0"/>
               </a:rPr>
-              <a:t>Rupnik</a:t>
-            </a:r>
-            <a:r>
-              <a:rPr lang="en-GB" sz="788" dirty="0">
-                <a:latin typeface="Times New Roman" panose="02020603050405020304" pitchFamily="18" charset="0"/>
-                <a:cs typeface="Times New Roman" panose="02020603050405020304" pitchFamily="18" charset="0"/>
-              </a:rPr>
-              <a:t> et. al.) </a:t>
+              <a:t>[8]</a:t>
             </a:r>
             <a:endParaRPr lang="en-US" sz="788" dirty="0">
               <a:latin typeface="Times New Roman" panose="02020603050405020304" pitchFamily="18" charset="0"/>
@@ -3917,21 +3875,14 @@
                 <a:latin typeface="Times New Roman" panose="02020603050405020304" pitchFamily="18" charset="0"/>
                 <a:cs typeface="Times New Roman" panose="02020603050405020304" pitchFamily="18" charset="0"/>
               </a:rPr>
-              <a:t>SUMCOR SDP + random projections (</a:t>
-            </a:r>
-            <a:r>
-              <a:rPr lang="en-GB" sz="788" dirty="0" err="1">
+              <a:t>SUMCOR SDP + random projections </a:t>
+            </a:r>
+            <a:r>
+              <a:rPr lang="en-GB" sz="788" dirty="0" smtClean="0">
                 <a:latin typeface="Times New Roman" panose="02020603050405020304" pitchFamily="18" charset="0"/>
                 <a:cs typeface="Times New Roman" panose="02020603050405020304" pitchFamily="18" charset="0"/>
               </a:rPr>
-              <a:t>Rupnik</a:t>
-            </a:r>
-            <a:r>
-              <a:rPr lang="en-GB" sz="788" dirty="0">
-                <a:latin typeface="Times New Roman" panose="02020603050405020304" pitchFamily="18" charset="0"/>
-                <a:cs typeface="Times New Roman" panose="02020603050405020304" pitchFamily="18" charset="0"/>
-              </a:rPr>
-              <a:t> et. al.) </a:t>
+              <a:t>[8] </a:t>
             </a:r>
             <a:endParaRPr lang="en-US" sz="788" dirty="0">
               <a:latin typeface="Times New Roman" panose="02020603050405020304" pitchFamily="18" charset="0"/>
@@ -5038,21 +4989,14 @@
                 <a:latin typeface="Times New Roman" panose="02020603050405020304" pitchFamily="18" charset="0"/>
                 <a:cs typeface="Times New Roman" panose="02020603050405020304" pitchFamily="18" charset="0"/>
               </a:rPr>
-              <a:t>Application to Cross-Lingual Information Retrieval (</a:t>
-            </a:r>
-            <a:r>
-              <a:rPr lang="en-GB" sz="788" dirty="0" err="1">
+              <a:t>Application to Cross-Lingual Information Retrieval </a:t>
+            </a:r>
+            <a:r>
+              <a:rPr lang="en-GB" sz="788" dirty="0" smtClean="0">
                 <a:latin typeface="Times New Roman" panose="02020603050405020304" pitchFamily="18" charset="0"/>
                 <a:cs typeface="Times New Roman" panose="02020603050405020304" pitchFamily="18" charset="0"/>
               </a:rPr>
-              <a:t>Rupnik</a:t>
-            </a:r>
-            <a:r>
-              <a:rPr lang="en-GB" sz="788" dirty="0">
-                <a:latin typeface="Times New Roman" panose="02020603050405020304" pitchFamily="18" charset="0"/>
-                <a:cs typeface="Times New Roman" panose="02020603050405020304" pitchFamily="18" charset="0"/>
-              </a:rPr>
-              <a:t> et. al.)</a:t>
+              <a:t>[9]</a:t>
             </a:r>
             <a:endParaRPr lang="en-US" sz="788" dirty="0">
               <a:latin typeface="Times New Roman" panose="02020603050405020304" pitchFamily="18" charset="0"/>

</xml_diff>